<commit_message>
Update slides to final version
</commit_message>
<xml_diff>
--- a/Containerization as an Open Science tool.pptx
+++ b/Containerization as an Open Science tool.pptx
@@ -7573,15 +7573,7 @@
           <a:p>
             <a:r>
               <a:rPr lang="en-US" dirty="0" smtClean="0"/>
-              <a:t>Nicolas </a:t>
-            </a:r>
-            <a:r>
-              <a:rPr lang="en-US" dirty="0" err="1" smtClean="0"/>
-              <a:t>lefebvre</a:t>
-            </a:r>
-            <a:r>
-              <a:rPr lang="en-US" dirty="0" smtClean="0"/>
-              <a:t> – </a:t>
+              <a:t>Nicolas Lefebvre – </a:t>
             </a:r>
             <a:r>
               <a:rPr lang="en-US" dirty="0" err="1" smtClean="0"/>
@@ -8493,7 +8485,10 @@
               <a:buFontTx/>
               <a:buChar char="-"/>
             </a:pPr>
-            <a:endParaRPr lang="en-US" dirty="0" smtClean="0"/>
+            <a:r>
+              <a:rPr lang="en-US" dirty="0" smtClean="0"/>
+              <a:t>Volumes, ports</a:t>
+            </a:r>
           </a:p>
           <a:p>
             <a:pPr marL="342900" indent="-342900">
@@ -9628,228 +9623,9 @@
   <p:timing>
     <p:tnLst>
       <p:par>
-        <p:cTn id="1" dur="indefinite" restart="never" nodeType="tmRoot">
-          <p:childTnLst>
-            <p:seq concurrent="1" nextAc="seek">
-              <p:cTn id="2" dur="indefinite" nodeType="mainSeq">
-                <p:childTnLst>
-                  <p:par>
-                    <p:cTn id="3" fill="hold">
-                      <p:stCondLst>
-                        <p:cond delay="indefinite"/>
-                        <p:cond evt="onBegin" delay="0">
-                          <p:tn val="2"/>
-                        </p:cond>
-                      </p:stCondLst>
-                      <p:childTnLst>
-                        <p:par>
-                          <p:cTn id="4" fill="hold">
-                            <p:stCondLst>
-                              <p:cond delay="0"/>
-                            </p:stCondLst>
-                            <p:childTnLst>
-                              <p:par>
-                                <p:cTn id="5" presetID="10" presetClass="exit" presetSubtype="0" fill="hold" grpId="0" nodeType="withEffect">
-                                  <p:stCondLst>
-                                    <p:cond delay="0"/>
-                                  </p:stCondLst>
-                                  <p:childTnLst>
-                                    <p:animEffect transition="out" filter="fade">
-                                      <p:cBhvr>
-                                        <p:cTn id="6" dur="500"/>
-                                        <p:tgtEl>
-                                          <p:spTgt spid="3">
-                                            <p:txEl>
-                                              <p:pRg st="0" end="0"/>
-                                            </p:txEl>
-                                          </p:spTgt>
-                                        </p:tgtEl>
-                                      </p:cBhvr>
-                                    </p:animEffect>
-                                    <p:set>
-                                      <p:cBhvr>
-                                        <p:cTn id="7" dur="1" fill="hold">
-                                          <p:stCondLst>
-                                            <p:cond delay="499"/>
-                                          </p:stCondLst>
-                                        </p:cTn>
-                                        <p:tgtEl>
-                                          <p:spTgt spid="3">
-                                            <p:txEl>
-                                              <p:pRg st="0" end="0"/>
-                                            </p:txEl>
-                                          </p:spTgt>
-                                        </p:tgtEl>
-                                        <p:attrNameLst>
-                                          <p:attrName>style.visibility</p:attrName>
-                                        </p:attrNameLst>
-                                      </p:cBhvr>
-                                      <p:to>
-                                        <p:strVal val="hidden"/>
-                                      </p:to>
-                                    </p:set>
-                                  </p:childTnLst>
-                                </p:cTn>
-                              </p:par>
-                              <p:par>
-                                <p:cTn id="8" presetID="10" presetClass="exit" presetSubtype="0" fill="hold" grpId="0" nodeType="withEffect">
-                                  <p:stCondLst>
-                                    <p:cond delay="0"/>
-                                  </p:stCondLst>
-                                  <p:childTnLst>
-                                    <p:animEffect transition="out" filter="fade">
-                                      <p:cBhvr>
-                                        <p:cTn id="9" dur="500"/>
-                                        <p:tgtEl>
-                                          <p:spTgt spid="3">
-                                            <p:txEl>
-                                              <p:pRg st="1" end="1"/>
-                                            </p:txEl>
-                                          </p:spTgt>
-                                        </p:tgtEl>
-                                      </p:cBhvr>
-                                    </p:animEffect>
-                                    <p:set>
-                                      <p:cBhvr>
-                                        <p:cTn id="10" dur="1" fill="hold">
-                                          <p:stCondLst>
-                                            <p:cond delay="499"/>
-                                          </p:stCondLst>
-                                        </p:cTn>
-                                        <p:tgtEl>
-                                          <p:spTgt spid="3">
-                                            <p:txEl>
-                                              <p:pRg st="1" end="1"/>
-                                            </p:txEl>
-                                          </p:spTgt>
-                                        </p:tgtEl>
-                                        <p:attrNameLst>
-                                          <p:attrName>style.visibility</p:attrName>
-                                        </p:attrNameLst>
-                                      </p:cBhvr>
-                                      <p:to>
-                                        <p:strVal val="hidden"/>
-                                      </p:to>
-                                    </p:set>
-                                  </p:childTnLst>
-                                </p:cTn>
-                              </p:par>
-                              <p:par>
-                                <p:cTn id="11" presetID="10" presetClass="exit" presetSubtype="0" fill="hold" grpId="0" nodeType="withEffect">
-                                  <p:stCondLst>
-                                    <p:cond delay="0"/>
-                                  </p:stCondLst>
-                                  <p:childTnLst>
-                                    <p:animEffect transition="out" filter="fade">
-                                      <p:cBhvr>
-                                        <p:cTn id="12" dur="500"/>
-                                        <p:tgtEl>
-                                          <p:spTgt spid="3">
-                                            <p:txEl>
-                                              <p:pRg st="2" end="2"/>
-                                            </p:txEl>
-                                          </p:spTgt>
-                                        </p:tgtEl>
-                                      </p:cBhvr>
-                                    </p:animEffect>
-                                    <p:set>
-                                      <p:cBhvr>
-                                        <p:cTn id="13" dur="1" fill="hold">
-                                          <p:stCondLst>
-                                            <p:cond delay="499"/>
-                                          </p:stCondLst>
-                                        </p:cTn>
-                                        <p:tgtEl>
-                                          <p:spTgt spid="3">
-                                            <p:txEl>
-                                              <p:pRg st="2" end="2"/>
-                                            </p:txEl>
-                                          </p:spTgt>
-                                        </p:tgtEl>
-                                        <p:attrNameLst>
-                                          <p:attrName>style.visibility</p:attrName>
-                                        </p:attrNameLst>
-                                      </p:cBhvr>
-                                      <p:to>
-                                        <p:strVal val="hidden"/>
-                                      </p:to>
-                                    </p:set>
-                                  </p:childTnLst>
-                                </p:cTn>
-                              </p:par>
-                              <p:par>
-                                <p:cTn id="14" presetID="10" presetClass="exit" presetSubtype="0" fill="hold" grpId="0" nodeType="withEffect">
-                                  <p:stCondLst>
-                                    <p:cond delay="0"/>
-                                  </p:stCondLst>
-                                  <p:childTnLst>
-                                    <p:animEffect transition="out" filter="fade">
-                                      <p:cBhvr>
-                                        <p:cTn id="15" dur="500"/>
-                                        <p:tgtEl>
-                                          <p:spTgt spid="3">
-                                            <p:txEl>
-                                              <p:pRg st="3" end="3"/>
-                                            </p:txEl>
-                                          </p:spTgt>
-                                        </p:tgtEl>
-                                      </p:cBhvr>
-                                    </p:animEffect>
-                                    <p:set>
-                                      <p:cBhvr>
-                                        <p:cTn id="16" dur="1" fill="hold">
-                                          <p:stCondLst>
-                                            <p:cond delay="499"/>
-                                          </p:stCondLst>
-                                        </p:cTn>
-                                        <p:tgtEl>
-                                          <p:spTgt spid="3">
-                                            <p:txEl>
-                                              <p:pRg st="3" end="3"/>
-                                            </p:txEl>
-                                          </p:spTgt>
-                                        </p:tgtEl>
-                                        <p:attrNameLst>
-                                          <p:attrName>style.visibility</p:attrName>
-                                        </p:attrNameLst>
-                                      </p:cBhvr>
-                                      <p:to>
-                                        <p:strVal val="hidden"/>
-                                      </p:to>
-                                    </p:set>
-                                  </p:childTnLst>
-                                </p:cTn>
-                              </p:par>
-                            </p:childTnLst>
-                          </p:cTn>
-                        </p:par>
-                      </p:childTnLst>
-                    </p:cTn>
-                  </p:par>
-                </p:childTnLst>
-              </p:cTn>
-              <p:prevCondLst>
-                <p:cond evt="onPrev" delay="0">
-                  <p:tgtEl>
-                    <p:sldTgt/>
-                  </p:tgtEl>
-                </p:cond>
-              </p:prevCondLst>
-              <p:nextCondLst>
-                <p:cond evt="onNext" delay="0">
-                  <p:tgtEl>
-                    <p:sldTgt/>
-                  </p:tgtEl>
-                </p:cond>
-              </p:nextCondLst>
-            </p:seq>
-          </p:childTnLst>
-        </p:cTn>
+        <p:cTn id="1" dur="indefinite" restart="never" nodeType="tmRoot"/>
       </p:par>
     </p:tnLst>
-    <p:bldLst>
-      <p:bldP spid="3" grpId="0" build="p"/>
-    </p:bldLst>
   </p:timing>
 </p:sld>
 </file>

</xml_diff>